<commit_message>
att slide, modelo conceitual e logico
</commit_message>
<xml_diff>
--- a/3º Semestre/Programação em Banco de Dados/Projeto/Apresentação.pptx
+++ b/3º Semestre/Programação em Banco de Dados/Projeto/Apresentação.pptx
@@ -4381,7 +4381,7 @@
               <a:rPr lang="pt-BR" sz="800" dirty="0">
                 <a:latin typeface="Star Jedi" panose="040B0000000000000000" pitchFamily="82" charset="0"/>
               </a:rPr>
-              <a:t>RA </a:t>
+              <a:t>RA 1460281813004</a:t>
             </a:r>
             <a:endParaRPr lang="pt-BR" sz="1400" dirty="0">
               <a:latin typeface="Star Jedi" panose="040B0000000000000000" pitchFamily="82" charset="0"/>
@@ -11532,7 +11532,7 @@
               <a:rPr lang="pt-BR" sz="2800" dirty="0">
                 <a:latin typeface="+mj-lt"/>
               </a:rPr>
-              <a:t>Personagens possuir um ou mais: veículos e armas</a:t>
+              <a:t>Personagens podem possuir um ou mais: veículos e armas</a:t>
             </a:r>
           </a:p>
           <a:p>
@@ -12155,10 +12155,10 @@
       </p:pic>
       <p:pic>
         <p:nvPicPr>
-          <p:cNvPr id="8" name="Imagem 7" descr="Uma imagem contendo texto, mapa&#10;&#10;Descrição gerada automaticamente">
-            <a:extLst>
-              <a:ext uri="{FF2B5EF4-FFF2-40B4-BE49-F238E27FC236}">
-                <a16:creationId xmlns:a16="http://schemas.microsoft.com/office/drawing/2014/main" id="{F70DF389-0977-437B-868B-3760CF5D7E4B}"/>
+          <p:cNvPr id="5" name="Imagem 4" descr="Uma imagem contendo texto, mapa&#10;&#10;Descrição gerada automaticamente">
+            <a:extLst>
+              <a:ext uri="{FF2B5EF4-FFF2-40B4-BE49-F238E27FC236}">
+                <a16:creationId xmlns:a16="http://schemas.microsoft.com/office/drawing/2014/main" id="{74F6FC2D-ECC7-4C49-9A46-D522590C78BC}"/>
               </a:ext>
             </a:extLst>
           </p:cNvPr>
@@ -12181,8 +12181,8 @@
         </p:blipFill>
         <p:spPr>
           <a:xfrm>
-            <a:off x="4521200" y="1241"/>
-            <a:ext cx="5865628" cy="6363364"/>
+            <a:off x="4521200" y="26760"/>
+            <a:ext cx="7727517" cy="6267199"/>
           </a:xfrm>
           <a:prstGeom prst="rect">
             <a:avLst/>

</xml_diff>